<commit_message>
Added TIFF compatability to MIA and MIAFit
git-svn-id: svn://10.153.116.2/PAM@130 cb18dcf6-275f-e045-ae08-2e8c34a2df07
</commit_message>
<xml_diff>
--- a/New Pam.pptx
+++ b/New Pam.pptx
@@ -292,7 +292,7 @@
             <a:fld id="{1D8BD707-D9CF-40AE-B4C6-C98DA3205C09}" type="datetimeFigureOut">
               <a:rPr lang="en-US" smtClean="0"/>
               <a:pPr/>
-              <a:t>12-Nov-14</a:t>
+              <a:t>10-Feb-15</a:t>
             </a:fld>
             <a:endParaRPr lang="en-US"/>
           </a:p>
@@ -459,7 +459,7 @@
             <a:fld id="{1D8BD707-D9CF-40AE-B4C6-C98DA3205C09}" type="datetimeFigureOut">
               <a:rPr lang="en-US" smtClean="0"/>
               <a:pPr/>
-              <a:t>12-Nov-14</a:t>
+              <a:t>10-Feb-15</a:t>
             </a:fld>
             <a:endParaRPr lang="en-US"/>
           </a:p>
@@ -636,7 +636,7 @@
             <a:fld id="{1D8BD707-D9CF-40AE-B4C6-C98DA3205C09}" type="datetimeFigureOut">
               <a:rPr lang="en-US" smtClean="0"/>
               <a:pPr/>
-              <a:t>12-Nov-14</a:t>
+              <a:t>10-Feb-15</a:t>
             </a:fld>
             <a:endParaRPr lang="en-US"/>
           </a:p>
@@ -803,7 +803,7 @@
             <a:fld id="{1D8BD707-D9CF-40AE-B4C6-C98DA3205C09}" type="datetimeFigureOut">
               <a:rPr lang="en-US" smtClean="0"/>
               <a:pPr/>
-              <a:t>12-Nov-14</a:t>
+              <a:t>10-Feb-15</a:t>
             </a:fld>
             <a:endParaRPr lang="en-US"/>
           </a:p>
@@ -1046,7 +1046,7 @@
             <a:fld id="{1D8BD707-D9CF-40AE-B4C6-C98DA3205C09}" type="datetimeFigureOut">
               <a:rPr lang="en-US" smtClean="0"/>
               <a:pPr/>
-              <a:t>12-Nov-14</a:t>
+              <a:t>10-Feb-15</a:t>
             </a:fld>
             <a:endParaRPr lang="en-US"/>
           </a:p>
@@ -1331,7 +1331,7 @@
             <a:fld id="{1D8BD707-D9CF-40AE-B4C6-C98DA3205C09}" type="datetimeFigureOut">
               <a:rPr lang="en-US" smtClean="0"/>
               <a:pPr/>
-              <a:t>12-Nov-14</a:t>
+              <a:t>10-Feb-15</a:t>
             </a:fld>
             <a:endParaRPr lang="en-US"/>
           </a:p>
@@ -1750,7 +1750,7 @@
             <a:fld id="{1D8BD707-D9CF-40AE-B4C6-C98DA3205C09}" type="datetimeFigureOut">
               <a:rPr lang="en-US" smtClean="0"/>
               <a:pPr/>
-              <a:t>12-Nov-14</a:t>
+              <a:t>10-Feb-15</a:t>
             </a:fld>
             <a:endParaRPr lang="en-US"/>
           </a:p>
@@ -1865,7 +1865,7 @@
             <a:fld id="{1D8BD707-D9CF-40AE-B4C6-C98DA3205C09}" type="datetimeFigureOut">
               <a:rPr lang="en-US" smtClean="0"/>
               <a:pPr/>
-              <a:t>12-Nov-14</a:t>
+              <a:t>10-Feb-15</a:t>
             </a:fld>
             <a:endParaRPr lang="en-US"/>
           </a:p>
@@ -1957,7 +1957,7 @@
             <a:fld id="{1D8BD707-D9CF-40AE-B4C6-C98DA3205C09}" type="datetimeFigureOut">
               <a:rPr lang="en-US" smtClean="0"/>
               <a:pPr/>
-              <a:t>12-Nov-14</a:t>
+              <a:t>10-Feb-15</a:t>
             </a:fld>
             <a:endParaRPr lang="en-US"/>
           </a:p>
@@ -2231,7 +2231,7 @@
             <a:fld id="{1D8BD707-D9CF-40AE-B4C6-C98DA3205C09}" type="datetimeFigureOut">
               <a:rPr lang="en-US" smtClean="0"/>
               <a:pPr/>
-              <a:t>12-Nov-14</a:t>
+              <a:t>10-Feb-15</a:t>
             </a:fld>
             <a:endParaRPr lang="en-US"/>
           </a:p>
@@ -2481,7 +2481,7 @@
             <a:fld id="{1D8BD707-D9CF-40AE-B4C6-C98DA3205C09}" type="datetimeFigureOut">
               <a:rPr lang="en-US" smtClean="0"/>
               <a:pPr/>
-              <a:t>12-Nov-14</a:t>
+              <a:t>10-Feb-15</a:t>
             </a:fld>
             <a:endParaRPr lang="en-US"/>
           </a:p>
@@ -2691,7 +2691,7 @@
             <a:fld id="{1D8BD707-D9CF-40AE-B4C6-C98DA3205C09}" type="datetimeFigureOut">
               <a:rPr lang="en-US" smtClean="0"/>
               <a:pPr/>
-              <a:t>12-Nov-14</a:t>
+              <a:t>10-Feb-15</a:t>
             </a:fld>
             <a:endParaRPr lang="en-US"/>
           </a:p>
@@ -4534,7 +4534,22 @@
             </a:r>
             <a:r>
               <a:rPr lang="en-US" sz="1500" dirty="0" smtClean="0"/>
-              <a:t> (.txt file)</a:t>
+              <a:t> (.txt </a:t>
+            </a:r>
+            <a:r>
+              <a:rPr lang="en-US" sz="1500" dirty="0" smtClean="0"/>
+              <a:t>file</a:t>
+            </a:r>
+            <a:r>
+              <a:rPr lang="en-US" sz="1500" dirty="0"/>
+              <a:t>)</a:t>
+            </a:r>
+            <a:endParaRPr lang="en-US" sz="1500" dirty="0" smtClean="0"/>
+          </a:p>
+          <a:p>
+            <a:r>
+              <a:rPr lang="en-US" sz="2400" dirty="0" smtClean="0"/>
+              <a:t>Phasor</a:t>
             </a:r>
           </a:p>
           <a:p>
@@ -4544,34 +4559,10 @@
             </a:pPr>
             <a:r>
               <a:rPr lang="en-US" sz="1500" dirty="0" smtClean="0"/>
-              <a:t>Load individual</a:t>
-            </a:r>
-            <a:endParaRPr lang="en-US" sz="1500" dirty="0"/>
-          </a:p>
-          <a:p>
-            <a:pPr lvl="1">
-              <a:buFont typeface="Wingdings" pitchFamily="2" charset="2"/>
-              <a:buChar char="Ø"/>
-            </a:pPr>
-            <a:endParaRPr lang="en-US" sz="1500" dirty="0" smtClean="0"/>
-          </a:p>
-          <a:p>
-            <a:r>
-              <a:rPr lang="en-US" sz="2400" dirty="0" smtClean="0"/>
-              <a:t>Phasor</a:t>
-            </a:r>
-          </a:p>
-          <a:p>
-            <a:pPr lvl="1">
-              <a:buFont typeface="Wingdings" pitchFamily="2" charset="2"/>
-              <a:buChar char="Ø"/>
-            </a:pPr>
-            <a:r>
-              <a:rPr lang="en-US" sz="1500" dirty="0" smtClean="0"/>
               <a:t>Export region </a:t>
             </a:r>
             <a:r>
-              <a:rPr lang="en-US" sz="1500" smtClean="0"/>
+              <a:rPr lang="en-US" sz="1500" dirty="0" err="1" smtClean="0"/>
               <a:t>microtimes</a:t>
             </a:r>
             <a:endParaRPr lang="en-US" sz="1500" dirty="0" smtClean="0"/>

</xml_diff>

<commit_message>
Added diffusion simulation GUI
git-svn-id: svn://10.153.116.2/PAM@203 cb18dcf6-275f-e045-ae08-2e8c34a2df07
</commit_message>
<xml_diff>
--- a/New Pam.pptx
+++ b/New Pam.pptx
@@ -292,7 +292,7 @@
             <a:fld id="{1D8BD707-D9CF-40AE-B4C6-C98DA3205C09}" type="datetimeFigureOut">
               <a:rPr lang="en-US" smtClean="0"/>
               <a:pPr/>
-              <a:t>10-Feb-15</a:t>
+              <a:t>06-Mar-15</a:t>
             </a:fld>
             <a:endParaRPr lang="en-US"/>
           </a:p>
@@ -459,7 +459,7 @@
             <a:fld id="{1D8BD707-D9CF-40AE-B4C6-C98DA3205C09}" type="datetimeFigureOut">
               <a:rPr lang="en-US" smtClean="0"/>
               <a:pPr/>
-              <a:t>10-Feb-15</a:t>
+              <a:t>06-Mar-15</a:t>
             </a:fld>
             <a:endParaRPr lang="en-US"/>
           </a:p>
@@ -636,7 +636,7 @@
             <a:fld id="{1D8BD707-D9CF-40AE-B4C6-C98DA3205C09}" type="datetimeFigureOut">
               <a:rPr lang="en-US" smtClean="0"/>
               <a:pPr/>
-              <a:t>10-Feb-15</a:t>
+              <a:t>06-Mar-15</a:t>
             </a:fld>
             <a:endParaRPr lang="en-US"/>
           </a:p>
@@ -803,7 +803,7 @@
             <a:fld id="{1D8BD707-D9CF-40AE-B4C6-C98DA3205C09}" type="datetimeFigureOut">
               <a:rPr lang="en-US" smtClean="0"/>
               <a:pPr/>
-              <a:t>10-Feb-15</a:t>
+              <a:t>06-Mar-15</a:t>
             </a:fld>
             <a:endParaRPr lang="en-US"/>
           </a:p>
@@ -1046,7 +1046,7 @@
             <a:fld id="{1D8BD707-D9CF-40AE-B4C6-C98DA3205C09}" type="datetimeFigureOut">
               <a:rPr lang="en-US" smtClean="0"/>
               <a:pPr/>
-              <a:t>10-Feb-15</a:t>
+              <a:t>06-Mar-15</a:t>
             </a:fld>
             <a:endParaRPr lang="en-US"/>
           </a:p>
@@ -1331,7 +1331,7 @@
             <a:fld id="{1D8BD707-D9CF-40AE-B4C6-C98DA3205C09}" type="datetimeFigureOut">
               <a:rPr lang="en-US" smtClean="0"/>
               <a:pPr/>
-              <a:t>10-Feb-15</a:t>
+              <a:t>06-Mar-15</a:t>
             </a:fld>
             <a:endParaRPr lang="en-US"/>
           </a:p>
@@ -1750,7 +1750,7 @@
             <a:fld id="{1D8BD707-D9CF-40AE-B4C6-C98DA3205C09}" type="datetimeFigureOut">
               <a:rPr lang="en-US" smtClean="0"/>
               <a:pPr/>
-              <a:t>10-Feb-15</a:t>
+              <a:t>06-Mar-15</a:t>
             </a:fld>
             <a:endParaRPr lang="en-US"/>
           </a:p>
@@ -1865,7 +1865,7 @@
             <a:fld id="{1D8BD707-D9CF-40AE-B4C6-C98DA3205C09}" type="datetimeFigureOut">
               <a:rPr lang="en-US" smtClean="0"/>
               <a:pPr/>
-              <a:t>10-Feb-15</a:t>
+              <a:t>06-Mar-15</a:t>
             </a:fld>
             <a:endParaRPr lang="en-US"/>
           </a:p>
@@ -1957,7 +1957,7 @@
             <a:fld id="{1D8BD707-D9CF-40AE-B4C6-C98DA3205C09}" type="datetimeFigureOut">
               <a:rPr lang="en-US" smtClean="0"/>
               <a:pPr/>
-              <a:t>10-Feb-15</a:t>
+              <a:t>06-Mar-15</a:t>
             </a:fld>
             <a:endParaRPr lang="en-US"/>
           </a:p>
@@ -2231,7 +2231,7 @@
             <a:fld id="{1D8BD707-D9CF-40AE-B4C6-C98DA3205C09}" type="datetimeFigureOut">
               <a:rPr lang="en-US" smtClean="0"/>
               <a:pPr/>
-              <a:t>10-Feb-15</a:t>
+              <a:t>06-Mar-15</a:t>
             </a:fld>
             <a:endParaRPr lang="en-US"/>
           </a:p>
@@ -2481,7 +2481,7 @@
             <a:fld id="{1D8BD707-D9CF-40AE-B4C6-C98DA3205C09}" type="datetimeFigureOut">
               <a:rPr lang="en-US" smtClean="0"/>
               <a:pPr/>
-              <a:t>10-Feb-15</a:t>
+              <a:t>06-Mar-15</a:t>
             </a:fld>
             <a:endParaRPr lang="en-US"/>
           </a:p>
@@ -2691,7 +2691,7 @@
             <a:fld id="{1D8BD707-D9CF-40AE-B4C6-C98DA3205C09}" type="datetimeFigureOut">
               <a:rPr lang="en-US" smtClean="0"/>
               <a:pPr/>
-              <a:t>10-Feb-15</a:t>
+              <a:t>06-Mar-15</a:t>
             </a:fld>
             <a:endParaRPr lang="en-US"/>
           </a:p>
@@ -4490,12 +4490,14 @@
         </p:nvSpPr>
         <p:spPr>
           <a:xfrm>
-            <a:off x="457200" y="228600"/>
-            <a:ext cx="8229600" cy="6400800"/>
+            <a:off x="76200" y="0"/>
+            <a:ext cx="4114800" cy="6629400"/>
           </a:xfrm>
         </p:spPr>
         <p:txBody>
-          <a:bodyPr/>
+          <a:bodyPr>
+            <a:normAutofit lnSpcReduction="10000"/>
+          </a:bodyPr>
           <a:lstStyle/>
           <a:p>
             <a:r>
@@ -4505,7 +4507,7 @@
           </a:p>
           <a:p>
             <a:r>
-              <a:rPr lang="de-DE" sz="2000" dirty="0" smtClean="0"/>
+              <a:rPr lang="de-DE" sz="2400" dirty="0" smtClean="0"/>
               <a:t>FCSFit</a:t>
             </a:r>
           </a:p>
@@ -4534,11 +4536,7 @@
             </a:r>
             <a:r>
               <a:rPr lang="en-US" sz="1500" dirty="0" smtClean="0"/>
-              <a:t> (.txt </a:t>
-            </a:r>
-            <a:r>
-              <a:rPr lang="en-US" sz="1500" dirty="0" smtClean="0"/>
-              <a:t>file</a:t>
+              <a:t> (.txt file</a:t>
             </a:r>
             <a:r>
               <a:rPr lang="en-US" sz="1500" dirty="0"/>
@@ -4565,6 +4563,390 @@
               <a:rPr lang="en-US" sz="1500" dirty="0" err="1" smtClean="0"/>
               <a:t>microtimes</a:t>
             </a:r>
+            <a:endParaRPr lang="en-US" sz="1500" dirty="0"/>
+          </a:p>
+          <a:p>
+            <a:r>
+              <a:rPr lang="de-DE" sz="2400" dirty="0" smtClean="0"/>
+              <a:t>MIAFit</a:t>
+            </a:r>
+            <a:endParaRPr lang="de-DE" sz="2400" dirty="0"/>
+          </a:p>
+          <a:p>
+            <a:pPr lvl="1">
+              <a:buFont typeface="Wingdings" pitchFamily="2" charset="2"/>
+              <a:buChar char="Ø"/>
+            </a:pPr>
+            <a:r>
+              <a:rPr lang="en-US" sz="1500" dirty="0"/>
+              <a:t>Export </a:t>
+            </a:r>
+          </a:p>
+          <a:p>
+            <a:pPr lvl="1">
+              <a:buFont typeface="Wingdings" pitchFamily="2" charset="2"/>
+              <a:buChar char="Ø"/>
+            </a:pPr>
+            <a:r>
+              <a:rPr lang="en-US" sz="1500" dirty="0" smtClean="0"/>
+              <a:t>Load .</a:t>
+            </a:r>
+            <a:r>
+              <a:rPr lang="en-US" sz="1500" dirty="0" err="1" smtClean="0"/>
+              <a:t>tif</a:t>
+            </a:r>
+            <a:endParaRPr lang="en-US" sz="1500" dirty="0"/>
+          </a:p>
+          <a:p>
+            <a:r>
+              <a:rPr lang="en-US" sz="2400" dirty="0" smtClean="0"/>
+              <a:t>MIA</a:t>
+            </a:r>
+            <a:endParaRPr lang="en-US" sz="2400" dirty="0"/>
+          </a:p>
+          <a:p>
+            <a:pPr lvl="1">
+              <a:buFont typeface="Wingdings" pitchFamily="2" charset="2"/>
+              <a:buChar char="Ø"/>
+            </a:pPr>
+            <a:r>
+              <a:rPr lang="en-US" sz="1500" dirty="0" smtClean="0"/>
+              <a:t>TICS</a:t>
+            </a:r>
+          </a:p>
+          <a:p>
+            <a:pPr lvl="1">
+              <a:buFont typeface="Wingdings" pitchFamily="2" charset="2"/>
+              <a:buChar char="Ø"/>
+            </a:pPr>
+            <a:r>
+              <a:rPr lang="en-US" sz="1500" dirty="0" smtClean="0"/>
+              <a:t>STICS</a:t>
+            </a:r>
+          </a:p>
+          <a:p>
+            <a:pPr lvl="1">
+              <a:buFont typeface="Wingdings" pitchFamily="2" charset="2"/>
+              <a:buChar char="Ø"/>
+            </a:pPr>
+            <a:r>
+              <a:rPr lang="en-US" sz="1500" dirty="0" smtClean="0"/>
+              <a:t>Proper N&amp;B</a:t>
+            </a:r>
+          </a:p>
+          <a:p>
+            <a:pPr lvl="1">
+              <a:buFont typeface="Wingdings" pitchFamily="2" charset="2"/>
+              <a:buChar char="Ø"/>
+            </a:pPr>
+            <a:r>
+              <a:rPr lang="en-US" sz="1500" dirty="0" smtClean="0"/>
+              <a:t>Intensity analysis</a:t>
+            </a:r>
+          </a:p>
+          <a:p>
+            <a:pPr lvl="1">
+              <a:buFont typeface="Wingdings" pitchFamily="2" charset="2"/>
+              <a:buChar char="Ø"/>
+            </a:pPr>
+            <a:r>
+              <a:rPr lang="en-US" sz="1500" dirty="0" smtClean="0"/>
+              <a:t>Load other formats (e.g. from PAM)</a:t>
+            </a:r>
+          </a:p>
+          <a:p>
+            <a:pPr lvl="1">
+              <a:buFont typeface="Wingdings" pitchFamily="2" charset="2"/>
+              <a:buChar char="Ø"/>
+            </a:pPr>
+            <a:r>
+              <a:rPr lang="en-US" sz="1500" dirty="0" smtClean="0"/>
+              <a:t>Dead time</a:t>
+            </a:r>
+            <a:endParaRPr lang="en-US" sz="1500" dirty="0"/>
+          </a:p>
+          <a:p>
+            <a:r>
+              <a:rPr lang="de-DE" sz="2400" dirty="0" smtClean="0"/>
+              <a:t>FCSFit</a:t>
+            </a:r>
+            <a:endParaRPr lang="de-DE" sz="2400" dirty="0"/>
+          </a:p>
+          <a:p>
+            <a:pPr lvl="1">
+              <a:buFont typeface="Wingdings" pitchFamily="2" charset="2"/>
+              <a:buChar char="Ø"/>
+            </a:pPr>
+            <a:r>
+              <a:rPr lang="en-US" sz="1500" dirty="0" smtClean="0"/>
+              <a:t>Load .</a:t>
+            </a:r>
+            <a:r>
+              <a:rPr lang="en-US" sz="1500" dirty="0" err="1" smtClean="0"/>
+              <a:t>mcor</a:t>
+            </a:r>
+            <a:r>
+              <a:rPr lang="en-US" sz="1500" dirty="0" smtClean="0"/>
+              <a:t> files</a:t>
+            </a:r>
+          </a:p>
+          <a:p>
+            <a:r>
+              <a:rPr lang="en-US" sz="2400" dirty="0" smtClean="0"/>
+              <a:t>Simulation</a:t>
+            </a:r>
+          </a:p>
+          <a:p>
+            <a:pPr marL="742950" lvl="2" indent="-342900">
+              <a:buFont typeface="Wingdings" pitchFamily="2" charset="2"/>
+              <a:buChar char="Ø"/>
+            </a:pPr>
+            <a:r>
+              <a:rPr lang="en-US" sz="1500" dirty="0" smtClean="0"/>
+              <a:t>A lot of stuff</a:t>
+            </a:r>
+            <a:endParaRPr lang="en-US" sz="1500" dirty="0"/>
+          </a:p>
+          <a:p>
+            <a:endParaRPr lang="en-US" sz="1500" dirty="0"/>
+          </a:p>
+          <a:p>
+            <a:pPr lvl="1">
+              <a:buFont typeface="Wingdings" pitchFamily="2" charset="2"/>
+              <a:buChar char="Ø"/>
+            </a:pPr>
+            <a:endParaRPr lang="en-US" sz="1500" dirty="0" smtClean="0"/>
+          </a:p>
+        </p:txBody>
+      </p:sp>
+      <p:sp>
+        <p:nvSpPr>
+          <p:cNvPr id="4" name="Content Placeholder 2"/>
+          <p:cNvSpPr txBox="1">
+            <a:spLocks/>
+          </p:cNvSpPr>
+          <p:nvPr/>
+        </p:nvSpPr>
+        <p:spPr>
+          <a:xfrm>
+            <a:off x="4495800" y="76200"/>
+            <a:ext cx="4114800" cy="6629400"/>
+          </a:xfrm>
+          <a:prstGeom prst="rect">
+            <a:avLst/>
+          </a:prstGeom>
+        </p:spPr>
+        <p:txBody>
+          <a:bodyPr vert="horz" lIns="91440" tIns="45720" rIns="91440" bIns="45720" rtlCol="0">
+            <a:normAutofit/>
+          </a:bodyPr>
+          <a:lstStyle>
+            <a:lvl1pPr marL="342900" indent="-342900" algn="l" defTabSz="914400" rtl="0" eaLnBrk="1" latinLnBrk="0" hangingPunct="1">
+              <a:spcBef>
+                <a:spcPct val="20000"/>
+              </a:spcBef>
+              <a:buFont typeface="Arial" pitchFamily="34" charset="0"/>
+              <a:buChar char="•"/>
+              <a:defRPr sz="3200" kern="1200">
+                <a:solidFill>
+                  <a:schemeClr val="tx1"/>
+                </a:solidFill>
+                <a:latin typeface="+mn-lt"/>
+                <a:ea typeface="+mn-ea"/>
+                <a:cs typeface="+mn-cs"/>
+              </a:defRPr>
+            </a:lvl1pPr>
+            <a:lvl2pPr marL="742950" indent="-285750" algn="l" defTabSz="914400" rtl="0" eaLnBrk="1" latinLnBrk="0" hangingPunct="1">
+              <a:spcBef>
+                <a:spcPct val="20000"/>
+              </a:spcBef>
+              <a:buFont typeface="Arial" pitchFamily="34" charset="0"/>
+              <a:buChar char="–"/>
+              <a:defRPr sz="2800" kern="1200">
+                <a:solidFill>
+                  <a:schemeClr val="tx1"/>
+                </a:solidFill>
+                <a:latin typeface="+mn-lt"/>
+                <a:ea typeface="+mn-ea"/>
+                <a:cs typeface="+mn-cs"/>
+              </a:defRPr>
+            </a:lvl2pPr>
+            <a:lvl3pPr marL="1143000" indent="-228600" algn="l" defTabSz="914400" rtl="0" eaLnBrk="1" latinLnBrk="0" hangingPunct="1">
+              <a:spcBef>
+                <a:spcPct val="20000"/>
+              </a:spcBef>
+              <a:buFont typeface="Arial" pitchFamily="34" charset="0"/>
+              <a:buChar char="•"/>
+              <a:defRPr sz="2400" kern="1200">
+                <a:solidFill>
+                  <a:schemeClr val="tx1"/>
+                </a:solidFill>
+                <a:latin typeface="+mn-lt"/>
+                <a:ea typeface="+mn-ea"/>
+                <a:cs typeface="+mn-cs"/>
+              </a:defRPr>
+            </a:lvl3pPr>
+            <a:lvl4pPr marL="1600200" indent="-228600" algn="l" defTabSz="914400" rtl="0" eaLnBrk="1" latinLnBrk="0" hangingPunct="1">
+              <a:spcBef>
+                <a:spcPct val="20000"/>
+              </a:spcBef>
+              <a:buFont typeface="Arial" pitchFamily="34" charset="0"/>
+              <a:buChar char="–"/>
+              <a:defRPr sz="2000" kern="1200">
+                <a:solidFill>
+                  <a:schemeClr val="tx1"/>
+                </a:solidFill>
+                <a:latin typeface="+mn-lt"/>
+                <a:ea typeface="+mn-ea"/>
+                <a:cs typeface="+mn-cs"/>
+              </a:defRPr>
+            </a:lvl4pPr>
+            <a:lvl5pPr marL="2057400" indent="-228600" algn="l" defTabSz="914400" rtl="0" eaLnBrk="1" latinLnBrk="0" hangingPunct="1">
+              <a:spcBef>
+                <a:spcPct val="20000"/>
+              </a:spcBef>
+              <a:buFont typeface="Arial" pitchFamily="34" charset="0"/>
+              <a:buChar char="»"/>
+              <a:defRPr sz="2000" kern="1200">
+                <a:solidFill>
+                  <a:schemeClr val="tx1"/>
+                </a:solidFill>
+                <a:latin typeface="+mn-lt"/>
+                <a:ea typeface="+mn-ea"/>
+                <a:cs typeface="+mn-cs"/>
+              </a:defRPr>
+            </a:lvl5pPr>
+            <a:lvl6pPr marL="2514600" indent="-228600" algn="l" defTabSz="914400" rtl="0" eaLnBrk="1" latinLnBrk="0" hangingPunct="1">
+              <a:spcBef>
+                <a:spcPct val="20000"/>
+              </a:spcBef>
+              <a:buFont typeface="Arial" pitchFamily="34" charset="0"/>
+              <a:buChar char="•"/>
+              <a:defRPr sz="2000" kern="1200">
+                <a:solidFill>
+                  <a:schemeClr val="tx1"/>
+                </a:solidFill>
+                <a:latin typeface="+mn-lt"/>
+                <a:ea typeface="+mn-ea"/>
+                <a:cs typeface="+mn-cs"/>
+              </a:defRPr>
+            </a:lvl6pPr>
+            <a:lvl7pPr marL="2971800" indent="-228600" algn="l" defTabSz="914400" rtl="0" eaLnBrk="1" latinLnBrk="0" hangingPunct="1">
+              <a:spcBef>
+                <a:spcPct val="20000"/>
+              </a:spcBef>
+              <a:buFont typeface="Arial" pitchFamily="34" charset="0"/>
+              <a:buChar char="•"/>
+              <a:defRPr sz="2000" kern="1200">
+                <a:solidFill>
+                  <a:schemeClr val="tx1"/>
+                </a:solidFill>
+                <a:latin typeface="+mn-lt"/>
+                <a:ea typeface="+mn-ea"/>
+                <a:cs typeface="+mn-cs"/>
+              </a:defRPr>
+            </a:lvl7pPr>
+            <a:lvl8pPr marL="3429000" indent="-228600" algn="l" defTabSz="914400" rtl="0" eaLnBrk="1" latinLnBrk="0" hangingPunct="1">
+              <a:spcBef>
+                <a:spcPct val="20000"/>
+              </a:spcBef>
+              <a:buFont typeface="Arial" pitchFamily="34" charset="0"/>
+              <a:buChar char="•"/>
+              <a:defRPr sz="2000" kern="1200">
+                <a:solidFill>
+                  <a:schemeClr val="tx1"/>
+                </a:solidFill>
+                <a:latin typeface="+mn-lt"/>
+                <a:ea typeface="+mn-ea"/>
+                <a:cs typeface="+mn-cs"/>
+              </a:defRPr>
+            </a:lvl8pPr>
+            <a:lvl9pPr marL="3886200" indent="-228600" algn="l" defTabSz="914400" rtl="0" eaLnBrk="1" latinLnBrk="0" hangingPunct="1">
+              <a:spcBef>
+                <a:spcPct val="20000"/>
+              </a:spcBef>
+              <a:buFont typeface="Arial" pitchFamily="34" charset="0"/>
+              <a:buChar char="•"/>
+              <a:defRPr sz="2000" kern="1200">
+                <a:solidFill>
+                  <a:schemeClr val="tx1"/>
+                </a:solidFill>
+                <a:latin typeface="+mn-lt"/>
+                <a:ea typeface="+mn-ea"/>
+                <a:cs typeface="+mn-cs"/>
+              </a:defRPr>
+            </a:lvl9pPr>
+          </a:lstStyle>
+          <a:p>
+            <a:r>
+              <a:rPr lang="de-DE" dirty="0" smtClean="0"/>
+              <a:t>To do</a:t>
+            </a:r>
+          </a:p>
+          <a:p>
+            <a:r>
+              <a:rPr lang="de-DE" sz="2400" dirty="0" smtClean="0"/>
+              <a:t>Pam</a:t>
+            </a:r>
+          </a:p>
+          <a:p>
+            <a:pPr lvl="1">
+              <a:buFont typeface="Wingdings" pitchFamily="2" charset="2"/>
+              <a:buChar char="Ø"/>
+            </a:pPr>
+            <a:r>
+              <a:rPr lang="en-US" sz="1500" dirty="0" smtClean="0"/>
+              <a:t>Export as .txt</a:t>
+            </a:r>
+          </a:p>
+          <a:p>
+            <a:pPr lvl="1">
+              <a:buFont typeface="Wingdings" pitchFamily="2" charset="2"/>
+              <a:buChar char="Ø"/>
+            </a:pPr>
+            <a:r>
+              <a:rPr lang="en-US" sz="1500" dirty="0" smtClean="0"/>
+              <a:t>Additional file types</a:t>
+            </a:r>
+          </a:p>
+          <a:p>
+            <a:r>
+              <a:rPr lang="en-US" sz="2400" dirty="0" smtClean="0"/>
+              <a:t>Burst explorer</a:t>
+            </a:r>
+          </a:p>
+          <a:p>
+            <a:pPr lvl="1">
+              <a:buFont typeface="Wingdings" pitchFamily="2" charset="2"/>
+              <a:buChar char="Ø"/>
+            </a:pPr>
+            <a:r>
+              <a:rPr lang="en-US" sz="1500" dirty="0" smtClean="0"/>
+              <a:t>??</a:t>
+            </a:r>
+          </a:p>
+          <a:p>
+            <a:r>
+              <a:rPr lang="de-DE" sz="2400" dirty="0" smtClean="0"/>
+              <a:t>TauFit</a:t>
+            </a:r>
+          </a:p>
+          <a:p>
+            <a:pPr lvl="1">
+              <a:buFont typeface="Wingdings" pitchFamily="2" charset="2"/>
+              <a:buChar char="Ø"/>
+            </a:pPr>
+            <a:r>
+              <a:rPr lang="en-US" sz="1500" smtClean="0"/>
+              <a:t>??</a:t>
+            </a:r>
+            <a:endParaRPr lang="en-US" sz="1500" dirty="0" smtClean="0"/>
+          </a:p>
+          <a:p>
+            <a:pPr lvl="1">
+              <a:buFont typeface="Wingdings" pitchFamily="2" charset="2"/>
+              <a:buChar char="Ø"/>
+            </a:pPr>
             <a:endParaRPr lang="en-US" sz="1500" dirty="0" smtClean="0"/>
           </a:p>
         </p:txBody>

</xml_diff>

<commit_message>
Added loading of individual curves in FCSFit
git-svn-id: svn://10.153.116.2/PAM@239 cb18dcf6-275f-e045-ae08-2e8c34a2df07
</commit_message>
<xml_diff>
--- a/New Pam.pptx
+++ b/New Pam.pptx
@@ -292,7 +292,7 @@
             <a:fld id="{1D8BD707-D9CF-40AE-B4C6-C98DA3205C09}" type="datetimeFigureOut">
               <a:rPr lang="en-US" smtClean="0"/>
               <a:pPr/>
-              <a:t>06-Mar-15</a:t>
+              <a:t>20-Mar-15</a:t>
             </a:fld>
             <a:endParaRPr lang="en-US"/>
           </a:p>
@@ -459,7 +459,7 @@
             <a:fld id="{1D8BD707-D9CF-40AE-B4C6-C98DA3205C09}" type="datetimeFigureOut">
               <a:rPr lang="en-US" smtClean="0"/>
               <a:pPr/>
-              <a:t>06-Mar-15</a:t>
+              <a:t>20-Mar-15</a:t>
             </a:fld>
             <a:endParaRPr lang="en-US"/>
           </a:p>
@@ -636,7 +636,7 @@
             <a:fld id="{1D8BD707-D9CF-40AE-B4C6-C98DA3205C09}" type="datetimeFigureOut">
               <a:rPr lang="en-US" smtClean="0"/>
               <a:pPr/>
-              <a:t>06-Mar-15</a:t>
+              <a:t>20-Mar-15</a:t>
             </a:fld>
             <a:endParaRPr lang="en-US"/>
           </a:p>
@@ -803,7 +803,7 @@
             <a:fld id="{1D8BD707-D9CF-40AE-B4C6-C98DA3205C09}" type="datetimeFigureOut">
               <a:rPr lang="en-US" smtClean="0"/>
               <a:pPr/>
-              <a:t>06-Mar-15</a:t>
+              <a:t>20-Mar-15</a:t>
             </a:fld>
             <a:endParaRPr lang="en-US"/>
           </a:p>
@@ -1046,7 +1046,7 @@
             <a:fld id="{1D8BD707-D9CF-40AE-B4C6-C98DA3205C09}" type="datetimeFigureOut">
               <a:rPr lang="en-US" smtClean="0"/>
               <a:pPr/>
-              <a:t>06-Mar-15</a:t>
+              <a:t>20-Mar-15</a:t>
             </a:fld>
             <a:endParaRPr lang="en-US"/>
           </a:p>
@@ -1331,7 +1331,7 @@
             <a:fld id="{1D8BD707-D9CF-40AE-B4C6-C98DA3205C09}" type="datetimeFigureOut">
               <a:rPr lang="en-US" smtClean="0"/>
               <a:pPr/>
-              <a:t>06-Mar-15</a:t>
+              <a:t>20-Mar-15</a:t>
             </a:fld>
             <a:endParaRPr lang="en-US"/>
           </a:p>
@@ -1750,7 +1750,7 @@
             <a:fld id="{1D8BD707-D9CF-40AE-B4C6-C98DA3205C09}" type="datetimeFigureOut">
               <a:rPr lang="en-US" smtClean="0"/>
               <a:pPr/>
-              <a:t>06-Mar-15</a:t>
+              <a:t>20-Mar-15</a:t>
             </a:fld>
             <a:endParaRPr lang="en-US"/>
           </a:p>
@@ -1865,7 +1865,7 @@
             <a:fld id="{1D8BD707-D9CF-40AE-B4C6-C98DA3205C09}" type="datetimeFigureOut">
               <a:rPr lang="en-US" smtClean="0"/>
               <a:pPr/>
-              <a:t>06-Mar-15</a:t>
+              <a:t>20-Mar-15</a:t>
             </a:fld>
             <a:endParaRPr lang="en-US"/>
           </a:p>
@@ -1957,7 +1957,7 @@
             <a:fld id="{1D8BD707-D9CF-40AE-B4C6-C98DA3205C09}" type="datetimeFigureOut">
               <a:rPr lang="en-US" smtClean="0"/>
               <a:pPr/>
-              <a:t>06-Mar-15</a:t>
+              <a:t>20-Mar-15</a:t>
             </a:fld>
             <a:endParaRPr lang="en-US"/>
           </a:p>
@@ -2231,7 +2231,7 @@
             <a:fld id="{1D8BD707-D9CF-40AE-B4C6-C98DA3205C09}" type="datetimeFigureOut">
               <a:rPr lang="en-US" smtClean="0"/>
               <a:pPr/>
-              <a:t>06-Mar-15</a:t>
+              <a:t>20-Mar-15</a:t>
             </a:fld>
             <a:endParaRPr lang="en-US"/>
           </a:p>
@@ -2481,7 +2481,7 @@
             <a:fld id="{1D8BD707-D9CF-40AE-B4C6-C98DA3205C09}" type="datetimeFigureOut">
               <a:rPr lang="en-US" smtClean="0"/>
               <a:pPr/>
-              <a:t>06-Mar-15</a:t>
+              <a:t>20-Mar-15</a:t>
             </a:fld>
             <a:endParaRPr lang="en-US"/>
           </a:p>
@@ -2691,7 +2691,7 @@
             <a:fld id="{1D8BD707-D9CF-40AE-B4C6-C98DA3205C09}" type="datetimeFigureOut">
               <a:rPr lang="en-US" smtClean="0"/>
               <a:pPr/>
-              <a:t>06-Mar-15</a:t>
+              <a:t>20-Mar-15</a:t>
             </a:fld>
             <a:endParaRPr lang="en-US"/>
           </a:p>
@@ -4539,8 +4539,8 @@
               <a:t> (.txt file</a:t>
             </a:r>
             <a:r>
-              <a:rPr lang="en-US" sz="1500" dirty="0"/>
-              <a:t>)</a:t>
+              <a:rPr lang="en-US" sz="1500" dirty="0" smtClean="0"/>
+              <a:t>), load individual curves</a:t>
             </a:r>
             <a:endParaRPr lang="en-US" sz="1500" dirty="0" smtClean="0"/>
           </a:p>
@@ -4667,8 +4667,8 @@
           </a:p>
           <a:p>
             <a:r>
-              <a:rPr lang="de-DE" sz="2400" dirty="0" smtClean="0"/>
-              <a:t>FCSFit</a:t>
+              <a:rPr lang="de-DE" sz="2400" smtClean="0"/>
+              <a:t>PCFAnalysis</a:t>
             </a:r>
             <a:endParaRPr lang="de-DE" sz="2400" dirty="0"/>
           </a:p>

</xml_diff>